<commit_message>
Final code inspection and modifications
</commit_message>
<xml_diff>
--- a/Decentralized Prediction of Social Harm Events - Project Presentation.pptx
+++ b/Decentralized Prediction of Social Harm Events - Project Presentation.pptx
@@ -11,10 +11,9 @@
     <p:sldId id="265" r:id="rId5"/>
     <p:sldId id="259" r:id="rId6"/>
     <p:sldId id="260" r:id="rId7"/>
-    <p:sldId id="261" r:id="rId8"/>
-    <p:sldId id="262" r:id="rId9"/>
-    <p:sldId id="263" r:id="rId10"/>
-    <p:sldId id="264" r:id="rId11"/>
+    <p:sldId id="262" r:id="rId8"/>
+    <p:sldId id="263" r:id="rId9"/>
+    <p:sldId id="264" r:id="rId10"/>
   </p:sldIdLst>
   <p:sldSz cx="12192000" cy="6858000"/>
   <p:notesSz cx="6858000" cy="9144000"/>
@@ -113,6 +112,11 @@
       </a:defRPr>
     </a:lvl9pPr>
   </p:defaultTextStyle>
+  <p:extLst>
+    <p:ext uri="{EFAFB233-063F-42B5-8137-9DF3F51BA10A}">
+      <p15:sldGuideLst xmlns:p15="http://schemas.microsoft.com/office/powerpoint/2012/main"/>
+    </p:ext>
+  </p:extLst>
 </p:presentation>
 </file>
 
@@ -862,7 +866,7 @@
             <a:fld id="{B61BEF0D-F0BB-DE4B-95CE-6DB70DBA9567}" type="datetimeFigureOut">
               <a:rPr lang="en-US" dirty="0"/>
               <a:pPr/>
-              <a:t>12/9/2019</a:t>
+              <a:t>12/11/2019</a:t>
             </a:fld>
             <a:endParaRPr lang="en-US" dirty="0"/>
           </a:p>
@@ -1110,7 +1114,7 @@
             <a:fld id="{B61BEF0D-F0BB-DE4B-95CE-6DB70DBA9567}" type="datetimeFigureOut">
               <a:rPr lang="en-US" dirty="0"/>
               <a:pPr/>
-              <a:t>12/9/2019</a:t>
+              <a:t>12/11/2019</a:t>
             </a:fld>
             <a:endParaRPr lang="en-US" dirty="0"/>
           </a:p>
@@ -1421,7 +1425,7 @@
             <a:fld id="{B61BEF0D-F0BB-DE4B-95CE-6DB70DBA9567}" type="datetimeFigureOut">
               <a:rPr lang="en-US" dirty="0"/>
               <a:pPr/>
-              <a:t>12/9/2019</a:t>
+              <a:t>12/11/2019</a:t>
             </a:fld>
             <a:endParaRPr lang="en-US" dirty="0"/>
           </a:p>
@@ -1751,7 +1755,7 @@
             <a:fld id="{B61BEF0D-F0BB-DE4B-95CE-6DB70DBA9567}" type="datetimeFigureOut">
               <a:rPr lang="en-US" dirty="0"/>
               <a:pPr/>
-              <a:t>12/9/2019</a:t>
+              <a:t>12/11/2019</a:t>
             </a:fld>
             <a:endParaRPr lang="en-US" dirty="0"/>
           </a:p>
@@ -2062,7 +2066,7 @@
             <a:fld id="{B61BEF0D-F0BB-DE4B-95CE-6DB70DBA9567}" type="datetimeFigureOut">
               <a:rPr lang="en-US" dirty="0"/>
               <a:pPr/>
-              <a:t>12/9/2019</a:t>
+              <a:t>12/11/2019</a:t>
             </a:fld>
             <a:endParaRPr lang="en-US" dirty="0"/>
           </a:p>
@@ -2452,7 +2456,7 @@
             <a:fld id="{B61BEF0D-F0BB-DE4B-95CE-6DB70DBA9567}" type="datetimeFigureOut">
               <a:rPr lang="en-US" dirty="0"/>
               <a:pPr/>
-              <a:t>12/9/2019</a:t>
+              <a:t>12/11/2019</a:t>
             </a:fld>
             <a:endParaRPr lang="en-US" dirty="0"/>
           </a:p>
@@ -2618,7 +2622,7 @@
           <a:p>
             <a:fld id="{55C6B4A9-1611-4792-9094-5F34BCA07E0B}" type="datetimeFigureOut">
               <a:rPr lang="en-US" dirty="0"/>
-              <a:t>12/9/2019</a:t>
+              <a:t>12/11/2019</a:t>
             </a:fld>
             <a:endParaRPr lang="en-US" dirty="0"/>
           </a:p>
@@ -2794,7 +2798,7 @@
             <a:fld id="{B61BEF0D-F0BB-DE4B-95CE-6DB70DBA9567}" type="datetimeFigureOut">
               <a:rPr lang="en-US" dirty="0"/>
               <a:pPr/>
-              <a:t>12/9/2019</a:t>
+              <a:t>12/11/2019</a:t>
             </a:fld>
             <a:endParaRPr lang="en-US" dirty="0"/>
           </a:p>
@@ -2960,7 +2964,7 @@
           <a:p>
             <a:fld id="{42A54C80-263E-416B-A8E0-580EDEADCBDC}" type="datetimeFigureOut">
               <a:rPr lang="en-US" dirty="0"/>
-              <a:t>12/9/2019</a:t>
+              <a:t>12/11/2019</a:t>
             </a:fld>
             <a:endParaRPr lang="en-US" dirty="0"/>
           </a:p>
@@ -3203,7 +3207,7 @@
             <a:fld id="{B61BEF0D-F0BB-DE4B-95CE-6DB70DBA9567}" type="datetimeFigureOut">
               <a:rPr lang="en-US" dirty="0"/>
               <a:pPr/>
-              <a:t>12/9/2019</a:t>
+              <a:t>12/11/2019</a:t>
             </a:fld>
             <a:endParaRPr lang="en-US" dirty="0"/>
           </a:p>
@@ -3431,7 +3435,7 @@
           <a:p>
             <a:fld id="{42A54C80-263E-416B-A8E0-580EDEADCBDC}" type="datetimeFigureOut">
               <a:rPr lang="en-US" dirty="0"/>
-              <a:t>12/9/2019</a:t>
+              <a:t>12/11/2019</a:t>
             </a:fld>
             <a:endParaRPr lang="en-US" dirty="0"/>
           </a:p>
@@ -3801,7 +3805,7 @@
             <a:fld id="{B61BEF0D-F0BB-DE4B-95CE-6DB70DBA9567}" type="datetimeFigureOut">
               <a:rPr lang="en-US" dirty="0"/>
               <a:pPr/>
-              <a:t>12/9/2019</a:t>
+              <a:t>12/11/2019</a:t>
             </a:fld>
             <a:endParaRPr lang="en-US" dirty="0"/>
           </a:p>
@@ -3921,7 +3925,7 @@
             <a:fld id="{B61BEF0D-F0BB-DE4B-95CE-6DB70DBA9567}" type="datetimeFigureOut">
               <a:rPr lang="en-US" dirty="0"/>
               <a:pPr/>
-              <a:t>12/9/2019</a:t>
+              <a:t>12/11/2019</a:t>
             </a:fld>
             <a:endParaRPr lang="en-US" dirty="0"/>
           </a:p>
@@ -4013,7 +4017,7 @@
             <a:fld id="{B61BEF0D-F0BB-DE4B-95CE-6DB70DBA9567}" type="datetimeFigureOut">
               <a:rPr lang="en-US" dirty="0"/>
               <a:pPr/>
-              <a:t>12/9/2019</a:t>
+              <a:t>12/11/2019</a:t>
             </a:fld>
             <a:endParaRPr lang="en-US" dirty="0"/>
           </a:p>
@@ -4264,7 +4268,7 @@
           <a:p>
             <a:fld id="{42A54C80-263E-416B-A8E0-580EDEADCBDC}" type="datetimeFigureOut">
               <a:rPr lang="en-US" dirty="0"/>
-              <a:t>12/9/2019</a:t>
+              <a:t>12/11/2019</a:t>
             </a:fld>
             <a:endParaRPr lang="en-US" dirty="0"/>
           </a:p>
@@ -4566,7 +4570,7 @@
             <a:fld id="{B61BEF0D-F0BB-DE4B-95CE-6DB70DBA9567}" type="datetimeFigureOut">
               <a:rPr lang="en-US" dirty="0"/>
               <a:pPr/>
-              <a:t>12/9/2019</a:t>
+              <a:t>12/11/2019</a:t>
             </a:fld>
             <a:endParaRPr lang="en-US" dirty="0"/>
           </a:p>
@@ -5264,7 +5268,7 @@
             <a:fld id="{B61BEF0D-F0BB-DE4B-95CE-6DB70DBA9567}" type="datetimeFigureOut">
               <a:rPr lang="en-US" dirty="0"/>
               <a:pPr/>
-              <a:t>12/9/2019</a:t>
+              <a:t>12/11/2019</a:t>
             </a:fld>
             <a:endParaRPr lang="en-US" dirty="0"/>
           </a:p>
@@ -5927,66 +5931,6 @@
 </p:sld>
 </file>
 
-<file path=ppt/slides/slide10.xml><?xml version="1.0" encoding="utf-8"?>
-<p:sld xmlns:a="http://schemas.openxmlformats.org/drawingml/2006/main" xmlns:r="http://schemas.openxmlformats.org/officeDocument/2006/relationships" xmlns:p="http://schemas.openxmlformats.org/presentationml/2006/main">
-  <p:cSld>
-    <p:spTree>
-      <p:nvGrpSpPr>
-        <p:cNvPr id="1" name=""/>
-        <p:cNvGrpSpPr/>
-        <p:nvPr/>
-      </p:nvGrpSpPr>
-      <p:grpSpPr>
-        <a:xfrm>
-          <a:off x="0" y="0"/>
-          <a:ext cx="0" cy="0"/>
-          <a:chOff x="0" y="0"/>
-          <a:chExt cx="0" cy="0"/>
-        </a:xfrm>
-      </p:grpSpPr>
-      <p:sp>
-        <p:nvSpPr>
-          <p:cNvPr id="2" name="Title 1"/>
-          <p:cNvSpPr>
-            <a:spLocks noGrp="1"/>
-          </p:cNvSpPr>
-          <p:nvPr>
-            <p:ph type="title"/>
-          </p:nvPr>
-        </p:nvSpPr>
-        <p:spPr>
-          <a:xfrm>
-            <a:off x="3333448" y="2325189"/>
-            <a:ext cx="3511489" cy="1219200"/>
-          </a:xfrm>
-        </p:spPr>
-        <p:txBody>
-          <a:bodyPr>
-            <a:normAutofit/>
-          </a:bodyPr>
-          <a:lstStyle/>
-          <a:p>
-            <a:r>
-              <a:rPr lang="en-US" sz="5400" dirty="0" smtClean="0"/>
-              <a:t>Questions</a:t>
-            </a:r>
-            <a:endParaRPr lang="en-US" sz="5400" dirty="0"/>
-          </a:p>
-        </p:txBody>
-      </p:sp>
-    </p:spTree>
-    <p:extLst>
-      <p:ext uri="{BB962C8B-B14F-4D97-AF65-F5344CB8AC3E}">
-        <p14:creationId xmlns:p14="http://schemas.microsoft.com/office/powerpoint/2010/main" val="3515513844"/>
-      </p:ext>
-    </p:extLst>
-  </p:cSld>
-  <p:clrMapOvr>
-    <a:masterClrMapping/>
-  </p:clrMapOvr>
-</p:sld>
-</file>
-
 <file path=ppt/slides/slide2.xml><?xml version="1.0" encoding="utf-8"?>
 <p:sld xmlns:a="http://schemas.openxmlformats.org/drawingml/2006/main" xmlns:r="http://schemas.openxmlformats.org/officeDocument/2006/relationships" xmlns:p="http://schemas.openxmlformats.org/presentationml/2006/main">
   <p:cSld>
@@ -6286,63 +6230,9 @@
           <a:chExt cx="0" cy="0"/>
         </a:xfrm>
       </p:grpSpPr>
-      <p:sp>
-        <p:nvSpPr>
-          <p:cNvPr id="2" name="Title 1"/>
-          <p:cNvSpPr>
-            <a:spLocks noGrp="1"/>
-          </p:cNvSpPr>
-          <p:nvPr>
-            <p:ph type="title"/>
-          </p:nvPr>
-        </p:nvSpPr>
-        <p:spPr>
-          <a:xfrm>
-            <a:off x="677334" y="609600"/>
-            <a:ext cx="8596668" cy="931817"/>
-          </a:xfrm>
-        </p:spPr>
-        <p:txBody>
-          <a:bodyPr/>
-          <a:lstStyle/>
-          <a:p>
-            <a:r>
-              <a:rPr lang="en-US" dirty="0" smtClean="0"/>
-              <a:t>Distributed Trust Nodes</a:t>
-            </a:r>
-            <a:endParaRPr lang="en-US" dirty="0"/>
-          </a:p>
-        </p:txBody>
-      </p:sp>
-      <p:sp>
-        <p:nvSpPr>
-          <p:cNvPr id="3" name="Content Placeholder 2"/>
-          <p:cNvSpPr>
-            <a:spLocks noGrp="1"/>
-          </p:cNvSpPr>
-          <p:nvPr>
-            <p:ph idx="1"/>
-          </p:nvPr>
-        </p:nvSpPr>
-        <p:spPr/>
-        <p:txBody>
-          <a:bodyPr/>
-          <a:lstStyle/>
-          <a:p>
-            <a:r>
-              <a:rPr lang="en-US" dirty="0"/>
-              <a:t>Project objective: To create a Trust Service module based on nodes that implements different trust models and collaborate to generate a common trust </a:t>
-            </a:r>
-            <a:r>
-              <a:rPr lang="en-US" dirty="0" smtClean="0"/>
-              <a:t>score</a:t>
-            </a:r>
-          </a:p>
-        </p:txBody>
-      </p:sp>
       <p:pic>
         <p:nvPicPr>
-          <p:cNvPr id="4" name="Picture 3"/>
+          <p:cNvPr id="6" name="Picture 5"/>
           <p:cNvPicPr>
             <a:picLocks noChangeAspect="1"/>
           </p:cNvPicPr>
@@ -6356,8 +6246,8 @@
         </p:blipFill>
         <p:spPr>
           <a:xfrm>
-            <a:off x="355074" y="3411084"/>
-            <a:ext cx="5438103" cy="3249450"/>
+            <a:off x="497738" y="3597692"/>
+            <a:ext cx="5148827" cy="3188796"/>
           </a:xfrm>
           <a:prstGeom prst="rect">
             <a:avLst/>
@@ -6366,71 +6256,68 @@
       </p:pic>
       <p:sp>
         <p:nvSpPr>
-          <p:cNvPr id="5" name="Diamond 4"/>
+          <p:cNvPr id="2" name="Title 1"/>
+          <p:cNvSpPr>
+            <a:spLocks noGrp="1"/>
+          </p:cNvSpPr>
+          <p:nvPr>
+            <p:ph type="title"/>
+          </p:nvPr>
+        </p:nvSpPr>
+        <p:spPr>
+          <a:xfrm>
+            <a:off x="677334" y="609600"/>
+            <a:ext cx="8596668" cy="931817"/>
+          </a:xfrm>
+        </p:spPr>
+        <p:txBody>
+          <a:bodyPr/>
+          <a:lstStyle/>
+          <a:p>
+            <a:r>
+              <a:rPr lang="en-US" dirty="0" smtClean="0"/>
+              <a:t>Distributed Trust Nodes</a:t>
+            </a:r>
+            <a:endParaRPr lang="en-US" dirty="0"/>
+          </a:p>
+        </p:txBody>
+      </p:sp>
+      <p:sp>
+        <p:nvSpPr>
+          <p:cNvPr id="3" name="Content Placeholder 2"/>
+          <p:cNvSpPr>
+            <a:spLocks noGrp="1"/>
+          </p:cNvSpPr>
+          <p:nvPr>
+            <p:ph idx="1"/>
+          </p:nvPr>
+        </p:nvSpPr>
+        <p:spPr/>
+        <p:txBody>
+          <a:bodyPr/>
+          <a:lstStyle/>
+          <a:p>
+            <a:r>
+              <a:rPr lang="en-US" dirty="0"/>
+              <a:t>Project objective: To create a Trust Service module based on nodes that implements different trust models and collaborate to generate a common trust </a:t>
+            </a:r>
+            <a:r>
+              <a:rPr lang="en-US" dirty="0" smtClean="0"/>
+              <a:t>score</a:t>
+            </a:r>
+          </a:p>
+        </p:txBody>
+      </p:sp>
+      <p:sp>
+        <p:nvSpPr>
+          <p:cNvPr id="10" name="Right Arrow 9"/>
           <p:cNvSpPr/>
           <p:nvPr/>
         </p:nvSpPr>
         <p:spPr>
-          <a:xfrm>
-            <a:off x="4427028" y="5686697"/>
-            <a:ext cx="1480457" cy="1127983"/>
-          </a:xfrm>
-          <a:prstGeom prst="diamond">
-            <a:avLst/>
-          </a:prstGeom>
-        </p:spPr>
-        <p:style>
-          <a:lnRef idx="2">
-            <a:schemeClr val="accent1">
-              <a:shade val="50000"/>
-            </a:schemeClr>
-          </a:lnRef>
-          <a:fillRef idx="1">
-            <a:schemeClr val="accent1"/>
-          </a:fillRef>
-          <a:effectRef idx="0">
-            <a:schemeClr val="accent1"/>
-          </a:effectRef>
-          <a:fontRef idx="minor">
-            <a:schemeClr val="lt1"/>
-          </a:fontRef>
-        </p:style>
-        <p:txBody>
-          <a:bodyPr rtlCol="0" anchor="ctr"/>
-          <a:lstStyle/>
-          <a:p>
-            <a:pPr algn="ctr"/>
-            <a:r>
-              <a:rPr lang="en-US" dirty="0" smtClean="0"/>
-              <a:t>Trust</a:t>
-            </a:r>
-          </a:p>
-          <a:p>
-            <a:pPr algn="ctr"/>
-            <a:r>
-              <a:rPr lang="en-US" dirty="0" smtClean="0"/>
-              <a:t>Node</a:t>
-            </a:r>
-          </a:p>
-          <a:p>
-            <a:pPr algn="ctr"/>
-            <a:r>
-              <a:rPr lang="en-US" dirty="0" smtClean="0"/>
-              <a:t>3</a:t>
-            </a:r>
-          </a:p>
-        </p:txBody>
-      </p:sp>
-      <p:sp>
-        <p:nvSpPr>
-          <p:cNvPr id="9" name="Right Arrow 8"/>
-          <p:cNvSpPr/>
-          <p:nvPr/>
-        </p:nvSpPr>
-        <p:spPr>
-          <a:xfrm>
-            <a:off x="3927566" y="5120640"/>
-            <a:ext cx="635725" cy="95794"/>
+          <a:xfrm rot="18475273" flipV="1">
+            <a:off x="3635103" y="4664084"/>
+            <a:ext cx="584197" cy="286216"/>
           </a:xfrm>
           <a:prstGeom prst="rightArrow">
             <a:avLst/>
@@ -6463,14 +6350,14 @@
       </p:sp>
       <p:sp>
         <p:nvSpPr>
-          <p:cNvPr id="10" name="Right Arrow 9"/>
+          <p:cNvPr id="11" name="Right Arrow 10"/>
           <p:cNvSpPr/>
           <p:nvPr/>
         </p:nvSpPr>
         <p:spPr>
-          <a:xfrm rot="18475273">
-            <a:off x="3824614" y="4480061"/>
-            <a:ext cx="950389" cy="72412"/>
+          <a:xfrm rot="2094357">
+            <a:off x="3678215" y="5300238"/>
+            <a:ext cx="472392" cy="300281"/>
           </a:xfrm>
           <a:prstGeom prst="rightArrow">
             <a:avLst/>
@@ -6503,14 +6390,14 @@
       </p:sp>
       <p:sp>
         <p:nvSpPr>
-          <p:cNvPr id="11" name="Right Arrow 10"/>
+          <p:cNvPr id="13" name="Right Arrow 12"/>
           <p:cNvSpPr/>
           <p:nvPr/>
         </p:nvSpPr>
         <p:spPr>
-          <a:xfrm rot="2094357">
-            <a:off x="3889224" y="5573553"/>
-            <a:ext cx="821167" cy="95794"/>
+          <a:xfrm rot="1830429">
+            <a:off x="5338760" y="4769762"/>
+            <a:ext cx="992777" cy="224862"/>
           </a:xfrm>
           <a:prstGeom prst="rightArrow">
             <a:avLst/>
@@ -6543,94 +6430,14 @@
       </p:sp>
       <p:sp>
         <p:nvSpPr>
-          <p:cNvPr id="12" name="Right Arrow 11"/>
-          <p:cNvSpPr/>
-          <p:nvPr/>
-        </p:nvSpPr>
-        <p:spPr>
-          <a:xfrm>
-            <a:off x="5793177" y="5216434"/>
-            <a:ext cx="432355" cy="130787"/>
-          </a:xfrm>
-          <a:prstGeom prst="rightArrow">
-            <a:avLst/>
-          </a:prstGeom>
-        </p:spPr>
-        <p:style>
-          <a:lnRef idx="2">
-            <a:schemeClr val="accent1">
-              <a:shade val="50000"/>
-            </a:schemeClr>
-          </a:lnRef>
-          <a:fillRef idx="1">
-            <a:schemeClr val="accent1"/>
-          </a:fillRef>
-          <a:effectRef idx="0">
-            <a:schemeClr val="accent1"/>
-          </a:effectRef>
-          <a:fontRef idx="minor">
-            <a:schemeClr val="lt1"/>
-          </a:fontRef>
-        </p:style>
-        <p:txBody>
-          <a:bodyPr rtlCol="0" anchor="ctr"/>
-          <a:lstStyle/>
-          <a:p>
-            <a:pPr algn="ctr"/>
-            <a:endParaRPr lang="en-US"/>
-          </a:p>
-        </p:txBody>
-      </p:sp>
-      <p:sp>
-        <p:nvSpPr>
-          <p:cNvPr id="13" name="Right Arrow 12"/>
-          <p:cNvSpPr/>
-          <p:nvPr/>
-        </p:nvSpPr>
-        <p:spPr>
-          <a:xfrm rot="3253621">
-            <a:off x="5453727" y="4576752"/>
-            <a:ext cx="992777" cy="104503"/>
-          </a:xfrm>
-          <a:prstGeom prst="rightArrow">
-            <a:avLst/>
-          </a:prstGeom>
-        </p:spPr>
-        <p:style>
-          <a:lnRef idx="2">
-            <a:schemeClr val="accent1">
-              <a:shade val="50000"/>
-            </a:schemeClr>
-          </a:lnRef>
-          <a:fillRef idx="1">
-            <a:schemeClr val="accent1"/>
-          </a:fillRef>
-          <a:effectRef idx="0">
-            <a:schemeClr val="accent1"/>
-          </a:effectRef>
-          <a:fontRef idx="minor">
-            <a:schemeClr val="lt1"/>
-          </a:fontRef>
-        </p:style>
-        <p:txBody>
-          <a:bodyPr rtlCol="0" anchor="ctr"/>
-          <a:lstStyle/>
-          <a:p>
-            <a:pPr algn="ctr"/>
-            <a:endParaRPr lang="en-US"/>
-          </a:p>
-        </p:txBody>
-      </p:sp>
-      <p:sp>
-        <p:nvSpPr>
           <p:cNvPr id="14" name="Right Arrow 13"/>
           <p:cNvSpPr/>
           <p:nvPr/>
         </p:nvSpPr>
         <p:spPr>
-          <a:xfrm rot="18523475">
-            <a:off x="5636424" y="5752361"/>
-            <a:ext cx="693612" cy="104527"/>
+          <a:xfrm rot="19042801">
+            <a:off x="5541453" y="5566090"/>
+            <a:ext cx="693612" cy="208219"/>
           </a:xfrm>
           <a:prstGeom prst="rightArrow">
             <a:avLst/>
@@ -6893,13 +6700,6 @@
             </a:r>
           </a:p>
           <a:p>
-            <a:pPr lvl="1"/>
-            <a:r>
-              <a:rPr lang="en-US" dirty="0"/>
-              <a:t>(Third)</a:t>
-            </a:r>
-          </a:p>
-          <a:p>
             <a:r>
               <a:rPr lang="en-US" dirty="0" smtClean="0"/>
               <a:t>These </a:t>
@@ -7251,78 +7051,6 @@
             <p:ph type="title"/>
           </p:nvPr>
         </p:nvSpPr>
-        <p:spPr/>
-        <p:txBody>
-          <a:bodyPr/>
-          <a:lstStyle/>
-          <a:p>
-            <a:r>
-              <a:rPr lang="en-US" dirty="0" smtClean="0"/>
-              <a:t>(Third Trusting Node)</a:t>
-            </a:r>
-            <a:endParaRPr lang="en-US" dirty="0"/>
-          </a:p>
-        </p:txBody>
-      </p:sp>
-      <p:sp>
-        <p:nvSpPr>
-          <p:cNvPr id="3" name="Content Placeholder 2"/>
-          <p:cNvSpPr>
-            <a:spLocks noGrp="1"/>
-          </p:cNvSpPr>
-          <p:nvPr>
-            <p:ph idx="1"/>
-          </p:nvPr>
-        </p:nvSpPr>
-        <p:spPr/>
-        <p:txBody>
-          <a:bodyPr/>
-          <a:lstStyle/>
-          <a:p>
-            <a:endParaRPr lang="en-US"/>
-          </a:p>
-        </p:txBody>
-      </p:sp>
-    </p:spTree>
-    <p:extLst>
-      <p:ext uri="{BB962C8B-B14F-4D97-AF65-F5344CB8AC3E}">
-        <p14:creationId xmlns:p14="http://schemas.microsoft.com/office/powerpoint/2010/main" val="2026229355"/>
-      </p:ext>
-    </p:extLst>
-  </p:cSld>
-  <p:clrMapOvr>
-    <a:masterClrMapping/>
-  </p:clrMapOvr>
-</p:sld>
-</file>
-
-<file path=ppt/slides/slide8.xml><?xml version="1.0" encoding="utf-8"?>
-<p:sld xmlns:a="http://schemas.openxmlformats.org/drawingml/2006/main" xmlns:r="http://schemas.openxmlformats.org/officeDocument/2006/relationships" xmlns:p="http://schemas.openxmlformats.org/presentationml/2006/main">
-  <p:cSld>
-    <p:spTree>
-      <p:nvGrpSpPr>
-        <p:cNvPr id="1" name=""/>
-        <p:cNvGrpSpPr/>
-        <p:nvPr/>
-      </p:nvGrpSpPr>
-      <p:grpSpPr>
-        <a:xfrm>
-          <a:off x="0" y="0"/>
-          <a:ext cx="0" cy="0"/>
-          <a:chOff x="0" y="0"/>
-          <a:chExt cx="0" cy="0"/>
-        </a:xfrm>
-      </p:grpSpPr>
-      <p:sp>
-        <p:nvSpPr>
-          <p:cNvPr id="2" name="Title 1"/>
-          <p:cNvSpPr>
-            <a:spLocks noGrp="1"/>
-          </p:cNvSpPr>
-          <p:nvPr>
-            <p:ph type="title"/>
-          </p:nvPr>
-        </p:nvSpPr>
         <p:spPr>
           <a:xfrm>
             <a:off x="1800740" y="1489165"/>
@@ -7398,7 +7126,7 @@
 </p:sld>
 </file>
 
-<file path=ppt/slides/slide9.xml><?xml version="1.0" encoding="utf-8"?>
+<file path=ppt/slides/slide8.xml><?xml version="1.0" encoding="utf-8"?>
 <p:sld xmlns:a="http://schemas.openxmlformats.org/drawingml/2006/main" xmlns:r="http://schemas.openxmlformats.org/officeDocument/2006/relationships" xmlns:p="http://schemas.openxmlformats.org/presentationml/2006/main">
   <p:cSld>
     <p:spTree>
@@ -7529,6 +7257,66 @@
     <p:extLst>
       <p:ext uri="{BB962C8B-B14F-4D97-AF65-F5344CB8AC3E}">
         <p14:creationId xmlns:p14="http://schemas.microsoft.com/office/powerpoint/2010/main" val="2938237339"/>
+      </p:ext>
+    </p:extLst>
+  </p:cSld>
+  <p:clrMapOvr>
+    <a:masterClrMapping/>
+  </p:clrMapOvr>
+</p:sld>
+</file>
+
+<file path=ppt/slides/slide9.xml><?xml version="1.0" encoding="utf-8"?>
+<p:sld xmlns:a="http://schemas.openxmlformats.org/drawingml/2006/main" xmlns:r="http://schemas.openxmlformats.org/officeDocument/2006/relationships" xmlns:p="http://schemas.openxmlformats.org/presentationml/2006/main">
+  <p:cSld>
+    <p:spTree>
+      <p:nvGrpSpPr>
+        <p:cNvPr id="1" name=""/>
+        <p:cNvGrpSpPr/>
+        <p:nvPr/>
+      </p:nvGrpSpPr>
+      <p:grpSpPr>
+        <a:xfrm>
+          <a:off x="0" y="0"/>
+          <a:ext cx="0" cy="0"/>
+          <a:chOff x="0" y="0"/>
+          <a:chExt cx="0" cy="0"/>
+        </a:xfrm>
+      </p:grpSpPr>
+      <p:sp>
+        <p:nvSpPr>
+          <p:cNvPr id="2" name="Title 1"/>
+          <p:cNvSpPr>
+            <a:spLocks noGrp="1"/>
+          </p:cNvSpPr>
+          <p:nvPr>
+            <p:ph type="title"/>
+          </p:nvPr>
+        </p:nvSpPr>
+        <p:spPr>
+          <a:xfrm>
+            <a:off x="3333448" y="2325189"/>
+            <a:ext cx="3511489" cy="1219200"/>
+          </a:xfrm>
+        </p:spPr>
+        <p:txBody>
+          <a:bodyPr>
+            <a:normAutofit/>
+          </a:bodyPr>
+          <a:lstStyle/>
+          <a:p>
+            <a:r>
+              <a:rPr lang="en-US" sz="5400" dirty="0" smtClean="0"/>
+              <a:t>Questions</a:t>
+            </a:r>
+            <a:endParaRPr lang="en-US" sz="5400" dirty="0"/>
+          </a:p>
+        </p:txBody>
+      </p:sp>
+    </p:spTree>
+    <p:extLst>
+      <p:ext uri="{BB962C8B-B14F-4D97-AF65-F5344CB8AC3E}">
+        <p14:creationId xmlns:p14="http://schemas.microsoft.com/office/powerpoint/2010/main" val="3515513844"/>
       </p:ext>
     </p:extLst>
   </p:cSld>

</xml_diff>